<commit_message>
using length instead of words
</commit_message>
<xml_diff>
--- a/output/songs.pptx
+++ b/output/songs.pptx
@@ -3572,7 +3572,7 @@
                 <a:latin typeface="Times New Roman" panose="02020603050405020304" pitchFamily="18" charset="0"/>
                 <a:cs typeface="Times New Roman" panose="02020603050405020304" pitchFamily="18" charset="0"/>
               </a:rPr>
-              <a:t>3. Con vững tin nơi Ngài là dòng suối tưới mát hồn con. Con vững tin nơi Ngài tình Ngài đại dương xót thương. Con</a:t>
+              <a:t>vững tin nơi Ngài dù bóng tôi khuất lối đi, dù mây đen giăng mịt mù dựa vào Chúa dẫn đường bước đi.</a:t>
             </a:r>
             <a:endParaRPr lang="en-US" sz="8800" b="1" dirty="0">
               <a:solidFill>
@@ -3631,7 +3631,7 @@
                 <a:latin typeface="Times New Roman" panose="02020603050405020304" pitchFamily="18" charset="0"/>
                 <a:cs typeface="Times New Roman" panose="02020603050405020304" pitchFamily="18" charset="0"/>
               </a:rPr>
-              <a:t>vững tin nơi Ngài tội lỗi dẫu có chất chồng dù con bao phen lạc đường một lòng tín thác tình Chúa thương.</a:t>
+              <a:t>3. Con vững tin nơi Ngài là dòng suối tưới mát hồn con. Con vững tin nơi Ngài tình Ngài đại dương xót thương.</a:t>
             </a:r>
             <a:endParaRPr lang="en-US" sz="8800" b="1" dirty="0">
               <a:solidFill>
@@ -3650,6 +3650,65 @@
 </file>
 
 <file path=ppt/slides/slide12.xml><?xml version="1.0" encoding="utf-8"?>
+<p:sld xmlns:a="http://schemas.openxmlformats.org/drawingml/2006/main" xmlns:p="http://schemas.openxmlformats.org/presentationml/2006/main" xmlns:r="http://schemas.openxmlformats.org/officeDocument/2006/relationships">
+  <p:cSld>
+    <p:spTree>
+      <p:nvGrpSpPr>
+        <p:cNvPr id="1" name=""/>
+        <p:cNvGrpSpPr/>
+        <p:nvPr/>
+      </p:nvGrpSpPr>
+      <p:grpSpPr/>
+      <p:sp>
+        <p:nvSpPr>
+          <p:cNvPr id="2" name="Title 1"/>
+          <p:cNvSpPr>
+            <a:spLocks noGrp="1"/>
+          </p:cNvSpPr>
+          <p:nvPr>
+            <p:ph type="ctrTitle"/>
+          </p:nvPr>
+        </p:nvSpPr>
+        <p:spPr>
+          <a:xfrm>
+            <a:off x="0" y="0"/>
+            <a:ext cx="12192000" cy="6858000"/>
+          </a:xfrm>
+        </p:spPr>
+        <p:txBody>
+          <a:bodyPr anchor="ctr">
+            <a:normAutofit/>
+          </a:bodyPr>
+          <a:lstStyle/>
+          <a:p>
+            <a:pPr algn="just"/>
+            <a:r>
+              <a:rPr lang="en-US" sz="8800" b="1" dirty="0">
+                <a:solidFill>
+                  <a:schemeClr val="bg1"/>
+                </a:solidFill>
+                <a:latin typeface="Times New Roman" panose="02020603050405020304" pitchFamily="18" charset="0"/>
+                <a:cs typeface="Times New Roman" panose="02020603050405020304" pitchFamily="18" charset="0"/>
+              </a:rPr>
+              <a:t>Con vững tin nơi Ngài tội lỗi dẫu có chất chồng dù con bao phen lạc đường một lòng tín thác tình Chúa thương.</a:t>
+            </a:r>
+            <a:endParaRPr lang="en-US" sz="8800" b="1" dirty="0">
+              <a:solidFill>
+                <a:schemeClr val="bg1"/>
+              </a:solidFill>
+            </a:endParaRPr>
+          </a:p>
+        </p:txBody>
+      </p:sp>
+    </p:spTree>
+  </p:cSld>
+  <p:clrMapOvr>
+    <a:masterClrMapping/>
+  </p:clrMapOvr>
+</p:sld>
+</file>
+
+<file path=ppt/slides/slide13.xml><?xml version="1.0" encoding="utf-8"?>
 <p:sld xmlns:a="http://schemas.openxmlformats.org/drawingml/2006/main" xmlns:p="http://schemas.openxmlformats.org/presentationml/2006/main" xmlns:r="http://schemas.openxmlformats.org/officeDocument/2006/relationships">
   <p:cSld>
     <p:spTree>
@@ -3770,65 +3829,6 @@
 </p:sld>
 </file>
 
-<file path=ppt/slides/slide13.xml><?xml version="1.0" encoding="utf-8"?>
-<p:sld xmlns:a="http://schemas.openxmlformats.org/drawingml/2006/main" xmlns:p="http://schemas.openxmlformats.org/presentationml/2006/main" xmlns:r="http://schemas.openxmlformats.org/officeDocument/2006/relationships">
-  <p:cSld>
-    <p:spTree>
-      <p:nvGrpSpPr>
-        <p:cNvPr id="1" name=""/>
-        <p:cNvGrpSpPr/>
-        <p:nvPr/>
-      </p:nvGrpSpPr>
-      <p:grpSpPr/>
-      <p:sp>
-        <p:nvSpPr>
-          <p:cNvPr id="2" name="Title 1"/>
-          <p:cNvSpPr>
-            <a:spLocks noGrp="1"/>
-          </p:cNvSpPr>
-          <p:nvPr>
-            <p:ph type="ctrTitle"/>
-          </p:nvPr>
-        </p:nvSpPr>
-        <p:spPr>
-          <a:xfrm>
-            <a:off x="0" y="0"/>
-            <a:ext cx="12192000" cy="6858000"/>
-          </a:xfrm>
-        </p:spPr>
-        <p:txBody>
-          <a:bodyPr anchor="ctr">
-            <a:normAutofit/>
-          </a:bodyPr>
-          <a:lstStyle/>
-          <a:p>
-            <a:pPr algn="just"/>
-            <a:r>
-              <a:rPr lang="en-US" sz="8800" b="1" dirty="0">
-                <a:solidFill>
-                  <a:schemeClr val="bg1"/>
-                </a:solidFill>
-                <a:latin typeface="Times New Roman" panose="02020603050405020304" pitchFamily="18" charset="0"/>
-                <a:cs typeface="Times New Roman" panose="02020603050405020304" pitchFamily="18" charset="0"/>
-              </a:rPr>
-              <a:t>ĐK: Khi nghĩ về Ngài, con tự nhủ: Hãy đi tìm thánh nhan. Đừng ẩn xa con ôi lạy Chúa, con đi tìm thánh nhan</a:t>
-            </a:r>
-            <a:endParaRPr lang="en-US" sz="8800" b="1" dirty="0">
-              <a:solidFill>
-                <a:schemeClr val="bg1"/>
-              </a:solidFill>
-            </a:endParaRPr>
-          </a:p>
-        </p:txBody>
-      </p:sp>
-    </p:spTree>
-  </p:cSld>
-  <p:clrMapOvr>
-    <a:masterClrMapping/>
-  </p:clrMapOvr>
-</p:sld>
-</file>
-
 <file path=ppt/slides/slide14.xml><?xml version="1.0" encoding="utf-8"?>
 <p:sld xmlns:a="http://schemas.openxmlformats.org/drawingml/2006/main" xmlns:p="http://schemas.openxmlformats.org/presentationml/2006/main" xmlns:r="http://schemas.openxmlformats.org/officeDocument/2006/relationships">
   <p:cSld>
@@ -3870,7 +3870,7 @@
                 <a:latin typeface="Times New Roman" panose="02020603050405020304" pitchFamily="18" charset="0"/>
                 <a:cs typeface="Times New Roman" panose="02020603050405020304" pitchFamily="18" charset="0"/>
               </a:rPr>
-              <a:t>Ngài.</a:t>
+              <a:t>ĐK: Khi nghĩ về Ngài, con tự nhủ: Hãy đi tìm thánh nhan. Đừng ẩn xa con ôi lạy Chúa, con đi tìm thánh nhan Ngài.</a:t>
             </a:r>
             <a:endParaRPr lang="en-US" sz="8800" b="1" dirty="0">
               <a:solidFill>
@@ -4168,7 +4168,7 @@
                 <a:latin typeface="Times New Roman" panose="02020603050405020304" pitchFamily="18" charset="0"/>
                 <a:cs typeface="Times New Roman" panose="02020603050405020304" pitchFamily="18" charset="0"/>
               </a:rPr>
-              <a:t>ĐK: Hãy biến đổi xa lợi danh thế trần. Sống với Chúa tâm hồn sẽ thanh nhàn. Chúa giúp sức cho niềm tin vững vàng.</a:t>
+              <a:t>ĐK: Hãy biến đổi xa lợi danh thế trần. Sống với Chúa tâm hồn sẽ thanh nhàn. Chúa giúp sức cho niềm tin vững</a:t>
             </a:r>
             <a:endParaRPr lang="en-US" sz="8800" b="1" dirty="0">
               <a:solidFill>
@@ -4227,7 +4227,7 @@
                 <a:latin typeface="Times New Roman" panose="02020603050405020304" pitchFamily="18" charset="0"/>
                 <a:cs typeface="Times New Roman" panose="02020603050405020304" pitchFamily="18" charset="0"/>
               </a:rPr>
-              <a:t>Hãy giũ hết bao tội lỗi đã mang.</a:t>
+              <a:t>vàng. Hãy giũ hết bao tội lỗi đã mang.</a:t>
             </a:r>
             <a:endParaRPr lang="en-US" sz="8800" b="1" dirty="0">
               <a:solidFill>
@@ -4490,7 +4490,7 @@
                 <a:cs typeface="Times New Roman" panose="02020603050405020304" pitchFamily="18" charset="0"/>
               </a:rPr>
               <a:t>ĐK: Xin dâng lên dâng trọn cuộc đời với bao yêu thương đầy vơi.
-1. Này là hương hoa đồng lúa quê nhà. Này là hương</a:t>
+1. Này là hương hoa đồng lúa quê nhà. Này là</a:t>
             </a:r>
             <a:endParaRPr lang="en-US" sz="8800" b="1" dirty="0">
               <a:solidFill>
@@ -4549,7 +4549,7 @@
                 <a:latin typeface="Times New Roman" panose="02020603050405020304" pitchFamily="18" charset="0"/>
                 <a:cs typeface="Times New Roman" panose="02020603050405020304" pitchFamily="18" charset="0"/>
               </a:rPr>
-              <a:t>hoa vườn trái phương xa. Hiệp lòng dâng Cha cùng với câu ca. Và niềm mơ ước đời sống an hòa.</a:t>
+              <a:t>hương hoa vườn trái phương xa. Hiệp lòng dâng Cha cùng với câu ca. Và niềm mơ ước đời sống an hòa.</a:t>
             </a:r>
             <a:endParaRPr lang="en-US" sz="8800" b="1" dirty="0">
               <a:solidFill>
@@ -4906,7 +4906,7 @@
                 <a:latin typeface="Times New Roman" panose="02020603050405020304" pitchFamily="18" charset="0"/>
                 <a:cs typeface="Times New Roman" panose="02020603050405020304" pitchFamily="18" charset="0"/>
               </a:rPr>
-              <a:t>ĐK: Đây Chúa đem mùa xuân, Chúa đem an hòa, trải rộng trần gian. Muôn trái tim hiệp thông, thiết tha dâng lời, tạ ơn</a:t>
+              <a:t>ĐK: Đây Chúa đem mùa xuân, Chúa đem an hòa, trải rộng trần gian. Muôn trái tim hiệp thông, thiết tha dâng lời,</a:t>
             </a:r>
             <a:endParaRPr lang="en-US" sz="8800" b="1" dirty="0">
               <a:solidFill>
@@ -4965,7 +4965,7 @@
                 <a:latin typeface="Times New Roman" panose="02020603050405020304" pitchFamily="18" charset="0"/>
                 <a:cs typeface="Times New Roman" panose="02020603050405020304" pitchFamily="18" charset="0"/>
               </a:rPr>
-              <a:t>Chúa Xuân.</a:t>
+              <a:t>tạ ơn Chúa Xuân.</a:t>
             </a:r>
             <a:endParaRPr lang="en-US" sz="8800" b="1" dirty="0">
               <a:solidFill>
@@ -5322,7 +5322,7 @@
                 <a:latin typeface="Times New Roman" panose="02020603050405020304" pitchFamily="18" charset="0"/>
                 <a:cs typeface="Times New Roman" panose="02020603050405020304" pitchFamily="18" charset="0"/>
               </a:rPr>
-              <a:t>Nguyện dâng lên Chúa những tin yêu. Niềm tin nhỏ bé rất chênh vênh, rất lung lay Chúa con ơi! Xin Ngài xót thương.</a:t>
+              <a:t>Nguyện dâng lên Chúa những tin yêu. Niềm tin nhỏ bé rất chênh vênh, rất lung lay Chúa con ơi! Xin Ngài xót</a:t>
             </a:r>
             <a:endParaRPr lang="en-US" sz="8800" b="1" dirty="0">
               <a:solidFill>
@@ -5381,7 +5381,7 @@
                 <a:latin typeface="Times New Roman" panose="02020603050405020304" pitchFamily="18" charset="0"/>
                 <a:cs typeface="Times New Roman" panose="02020603050405020304" pitchFamily="18" charset="0"/>
               </a:rPr>
-              <a:t>2. Con vững tin nơi Ngài là nguồn ánh sáng chiếu đời con. Con vững tin nơi Ngài là đường để con bước đi. Con</a:t>
+              <a:t>thương.</a:t>
             </a:r>
             <a:endParaRPr lang="en-US" sz="8800" b="1" dirty="0">
               <a:solidFill>
@@ -5440,7 +5440,7 @@
                 <a:latin typeface="Times New Roman" panose="02020603050405020304" pitchFamily="18" charset="0"/>
                 <a:cs typeface="Times New Roman" panose="02020603050405020304" pitchFamily="18" charset="0"/>
               </a:rPr>
-              <a:t>vững tin nơi Ngài dù bóng tôi khuất lối đi, dù mây đen giăng mịt mù dựa vào Chúa dẫn đường bước đi.</a:t>
+              <a:t>2. Con vững tin nơi Ngài là nguồn ánh sáng chiếu đời con. Con vững tin nơi Ngài là đường để con bước đi. Con</a:t>
             </a:r>
             <a:endParaRPr lang="en-US" sz="8800" b="1" dirty="0">
               <a:solidFill>

</xml_diff>